<commit_message>
Added data generation table to presentation.
</commit_message>
<xml_diff>
--- a/presentation/yinyang_k_means.pptx
+++ b/presentation/yinyang_k_means.pptx
@@ -9285,13 +9285,306 @@
           <a:p>
             <a:pPr lvl="1"/>
             <a:r>
-              <a:rPr lang="en-US" smtClean="0"/>
+              <a:rPr lang="en-US" dirty="0" smtClean="0"/>
               <a:t>Larger data sets got closer.</a:t>
             </a:r>
-            <a:endParaRPr lang="en-US" dirty="0"/>
+          </a:p>
+          <a:p>
+            <a:pPr marL="457200" lvl="1" indent="0">
+              <a:buNone/>
+            </a:pPr>
+            <a:endParaRPr lang="en-US" dirty="0" smtClean="0"/>
+          </a:p>
+          <a:p>
+            <a:pPr marL="457200" lvl="1" indent="0">
+              <a:buNone/>
+            </a:pPr>
+            <a:endParaRPr lang="en-US" dirty="0" smtClean="0"/>
           </a:p>
         </p:txBody>
       </p:sp>
+      <p:graphicFrame>
+        <p:nvGraphicFramePr>
+          <p:cNvPr id="7" name="Table 6"/>
+          <p:cNvGraphicFramePr>
+            <a:graphicFrameLocks noGrp="1"/>
+          </p:cNvGraphicFramePr>
+          <p:nvPr>
+            <p:extLst>
+              <p:ext uri="{D42A27DB-BD31-4B8C-83A1-F6EECF244321}">
+                <p14:modId xmlns:p14="http://schemas.microsoft.com/office/powerpoint/2010/main" val="1943925076"/>
+              </p:ext>
+            </p:extLst>
+          </p:nvPr>
+        </p:nvGraphicFramePr>
+        <p:xfrm>
+          <a:off x="550718" y="4088245"/>
+          <a:ext cx="8042564" cy="1483360"/>
+        </p:xfrm>
+        <a:graphic>
+          <a:graphicData uri="http://schemas.openxmlformats.org/drawingml/2006/table">
+            <a:tbl>
+              <a:tblPr firstRow="1" bandRow="1">
+                <a:tableStyleId>{5C22544A-7EE6-4342-B048-85BDC9FD1C3A}</a:tableStyleId>
+              </a:tblPr>
+              <a:tblGrid>
+                <a:gridCol w="2010641"/>
+                <a:gridCol w="1428750"/>
+                <a:gridCol w="2234046"/>
+                <a:gridCol w="2369127"/>
+              </a:tblGrid>
+              <a:tr h="370840">
+                <a:tc>
+                  <a:txBody>
+                    <a:bodyPr/>
+                    <a:lstStyle/>
+                    <a:p>
+                      <a:r>
+                        <a:rPr lang="en-US" dirty="0" smtClean="0"/>
+                        <a:t># Clusters</a:t>
+                      </a:r>
+                      <a:endParaRPr lang="en-US" dirty="0"/>
+                    </a:p>
+                  </a:txBody>
+                  <a:tcPr/>
+                </a:tc>
+                <a:tc>
+                  <a:txBody>
+                    <a:bodyPr/>
+                    <a:lstStyle/>
+                    <a:p>
+                      <a:r>
+                        <a:rPr lang="en-US" dirty="0" smtClean="0"/>
+                        <a:t># Features</a:t>
+                      </a:r>
+                      <a:endParaRPr lang="en-US" dirty="0"/>
+                    </a:p>
+                  </a:txBody>
+                  <a:tcPr/>
+                </a:tc>
+                <a:tc>
+                  <a:txBody>
+                    <a:bodyPr/>
+                    <a:lstStyle/>
+                    <a:p>
+                      <a:r>
+                        <a:rPr lang="en-US" dirty="0" smtClean="0"/>
+                        <a:t># Samples/Cluster</a:t>
+                      </a:r>
+                      <a:endParaRPr lang="en-US" dirty="0"/>
+                    </a:p>
+                  </a:txBody>
+                  <a:tcPr/>
+                </a:tc>
+                <a:tc>
+                  <a:txBody>
+                    <a:bodyPr/>
+                    <a:lstStyle/>
+                    <a:p>
+                      <a:r>
+                        <a:rPr lang="en-US" dirty="0" smtClean="0"/>
+                        <a:t>Dist.</a:t>
+                      </a:r>
+                      <a:r>
+                        <a:rPr lang="en-US" baseline="0" dirty="0" smtClean="0"/>
+                        <a:t> Between Means</a:t>
+                      </a:r>
+                      <a:endParaRPr lang="en-US" dirty="0"/>
+                    </a:p>
+                  </a:txBody>
+                  <a:tcPr/>
+                </a:tc>
+              </a:tr>
+              <a:tr h="370840">
+                <a:tc>
+                  <a:txBody>
+                    <a:bodyPr/>
+                    <a:lstStyle/>
+                    <a:p>
+                      <a:pPr algn="ctr"/>
+                      <a:r>
+                        <a:rPr lang="en-US" dirty="0" smtClean="0"/>
+                        <a:t>100</a:t>
+                      </a:r>
+                      <a:endParaRPr lang="en-US" dirty="0"/>
+                    </a:p>
+                  </a:txBody>
+                  <a:tcPr/>
+                </a:tc>
+                <a:tc>
+                  <a:txBody>
+                    <a:bodyPr/>
+                    <a:lstStyle/>
+                    <a:p>
+                      <a:pPr algn="ctr"/>
+                      <a:r>
+                        <a:rPr lang="en-US" dirty="0" smtClean="0"/>
+                        <a:t>100</a:t>
+                      </a:r>
+                      <a:endParaRPr lang="en-US" dirty="0"/>
+                    </a:p>
+                  </a:txBody>
+                  <a:tcPr/>
+                </a:tc>
+                <a:tc>
+                  <a:txBody>
+                    <a:bodyPr/>
+                    <a:lstStyle/>
+                    <a:p>
+                      <a:pPr algn="ctr"/>
+                      <a:r>
+                        <a:rPr lang="en-US" dirty="0" smtClean="0"/>
+                        <a:t>100</a:t>
+                      </a:r>
+                      <a:endParaRPr lang="en-US" dirty="0"/>
+                    </a:p>
+                  </a:txBody>
+                  <a:tcPr/>
+                </a:tc>
+                <a:tc>
+                  <a:txBody>
+                    <a:bodyPr/>
+                    <a:lstStyle/>
+                    <a:p>
+                      <a:pPr algn="ctr"/>
+                      <a:r>
+                        <a:rPr lang="en-US" dirty="0" smtClean="0"/>
+                        <a:t>100</a:t>
+                      </a:r>
+                      <a:endParaRPr lang="en-US" dirty="0"/>
+                    </a:p>
+                  </a:txBody>
+                  <a:tcPr/>
+                </a:tc>
+              </a:tr>
+              <a:tr h="370840">
+                <a:tc>
+                  <a:txBody>
+                    <a:bodyPr/>
+                    <a:lstStyle/>
+                    <a:p>
+                      <a:pPr algn="ctr"/>
+                      <a:r>
+                        <a:rPr lang="en-US" dirty="0" smtClean="0"/>
+                        <a:t>1,000</a:t>
+                      </a:r>
+                      <a:endParaRPr lang="en-US" dirty="0"/>
+                    </a:p>
+                  </a:txBody>
+                  <a:tcPr/>
+                </a:tc>
+                <a:tc>
+                  <a:txBody>
+                    <a:bodyPr/>
+                    <a:lstStyle/>
+                    <a:p>
+                      <a:pPr algn="ctr"/>
+                      <a:r>
+                        <a:rPr lang="en-US" dirty="0" smtClean="0"/>
+                        <a:t>500</a:t>
+                      </a:r>
+                      <a:endParaRPr lang="en-US" dirty="0"/>
+                    </a:p>
+                  </a:txBody>
+                  <a:tcPr/>
+                </a:tc>
+                <a:tc>
+                  <a:txBody>
+                    <a:bodyPr/>
+                    <a:lstStyle/>
+                    <a:p>
+                      <a:pPr algn="ctr"/>
+                      <a:r>
+                        <a:rPr lang="en-US" dirty="0" smtClean="0"/>
+                        <a:t>500</a:t>
+                      </a:r>
+                      <a:endParaRPr lang="en-US" dirty="0"/>
+                    </a:p>
+                  </a:txBody>
+                  <a:tcPr/>
+                </a:tc>
+                <a:tc>
+                  <a:txBody>
+                    <a:bodyPr/>
+                    <a:lstStyle/>
+                    <a:p>
+                      <a:pPr algn="ctr"/>
+                      <a:r>
+                        <a:rPr lang="en-US" dirty="0" smtClean="0"/>
+                        <a:t>500</a:t>
+                      </a:r>
+                      <a:endParaRPr lang="en-US" dirty="0"/>
+                    </a:p>
+                  </a:txBody>
+                  <a:tcPr/>
+                </a:tc>
+              </a:tr>
+              <a:tr h="370840">
+                <a:tc>
+                  <a:txBody>
+                    <a:bodyPr/>
+                    <a:lstStyle/>
+                    <a:p>
+                      <a:pPr algn="ctr"/>
+                      <a:r>
+                        <a:rPr lang="en-US" dirty="0" smtClean="0"/>
+                        <a:t>10,000</a:t>
+                      </a:r>
+                      <a:endParaRPr lang="en-US" dirty="0"/>
+                    </a:p>
+                  </a:txBody>
+                  <a:tcPr/>
+                </a:tc>
+                <a:tc>
+                  <a:txBody>
+                    <a:bodyPr/>
+                    <a:lstStyle/>
+                    <a:p>
+                      <a:pPr algn="ctr"/>
+                      <a:r>
+                        <a:rPr lang="en-US" dirty="0" smtClean="0"/>
+                        <a:t>1,000</a:t>
+                      </a:r>
+                      <a:endParaRPr lang="en-US" dirty="0"/>
+                    </a:p>
+                  </a:txBody>
+                  <a:tcPr/>
+                </a:tc>
+                <a:tc>
+                  <a:txBody>
+                    <a:bodyPr/>
+                    <a:lstStyle/>
+                    <a:p>
+                      <a:pPr algn="ctr"/>
+                      <a:r>
+                        <a:rPr lang="en-US" dirty="0" smtClean="0"/>
+                        <a:t>1,000</a:t>
+                      </a:r>
+                      <a:endParaRPr lang="en-US" dirty="0"/>
+                    </a:p>
+                  </a:txBody>
+                  <a:tcPr/>
+                </a:tc>
+                <a:tc>
+                  <a:txBody>
+                    <a:bodyPr/>
+                    <a:lstStyle/>
+                    <a:p>
+                      <a:pPr algn="ctr"/>
+                      <a:r>
+                        <a:rPr lang="en-US" dirty="0" smtClean="0"/>
+                        <a:t>1,000</a:t>
+                      </a:r>
+                      <a:endParaRPr lang="en-US" dirty="0"/>
+                    </a:p>
+                  </a:txBody>
+                  <a:tcPr/>
+                </a:tc>
+              </a:tr>
+            </a:tbl>
+          </a:graphicData>
+        </a:graphic>
+      </p:graphicFrame>
     </p:spTree>
     <p:extLst>
       <p:ext uri="{BB962C8B-B14F-4D97-AF65-F5344CB8AC3E}">

</xml_diff>

<commit_message>
Removed white space from figure png files. Updated figures in presentation.
</commit_message>
<xml_diff>
--- a/presentation/yinyang_k_means.pptx
+++ b/presentation/yinyang_k_means.pptx
@@ -9644,7 +9644,7 @@
       </p:sp>
       <p:pic>
         <p:nvPicPr>
-          <p:cNvPr id="5" name="Picture 4"/>
+          <p:cNvPr id="6" name="Picture 5"/>
           <p:cNvPicPr>
             <a:picLocks noChangeAspect="1"/>
           </p:cNvPicPr>
@@ -9664,8 +9664,8 @@
         </p:blipFill>
         <p:spPr>
           <a:xfrm>
-            <a:off x="795810" y="1319647"/>
-            <a:ext cx="7552380" cy="5424054"/>
+            <a:off x="-803975" y="1249163"/>
+            <a:ext cx="11063678" cy="5089292"/>
           </a:xfrm>
           <a:prstGeom prst="rect">
             <a:avLst/>
@@ -9731,7 +9731,7 @@
       </p:sp>
       <p:pic>
         <p:nvPicPr>
-          <p:cNvPr id="3" name="Picture 2"/>
+          <p:cNvPr id="5" name="Picture 4"/>
           <p:cNvPicPr>
             <a:picLocks noChangeAspect="1"/>
           </p:cNvPicPr>
@@ -9751,8 +9751,8 @@
         </p:blipFill>
         <p:spPr>
           <a:xfrm>
-            <a:off x="709003" y="1194955"/>
-            <a:ext cx="7725994" cy="5548744"/>
+            <a:off x="-935181" y="1257300"/>
+            <a:ext cx="11430000" cy="5257800"/>
           </a:xfrm>
           <a:prstGeom prst="rect">
             <a:avLst/>

</xml_diff>

<commit_message>
change presentation equation direction
</commit_message>
<xml_diff>
--- a/presentation/yinyang_k_means.pptx
+++ b/presentation/yinyang_k_means.pptx
@@ -264,7 +264,7 @@
           <a:p>
             <a:fld id="{A16E5697-36CC-4180-92D2-559739295E92}" type="datetimeFigureOut">
               <a:rPr lang="en-US" smtClean="0"/>
-              <a:t>4/27/2016</a:t>
+              <a:t>4/28/2016</a:t>
             </a:fld>
             <a:endParaRPr lang="en-US"/>
           </a:p>
@@ -434,7 +434,7 @@
           <a:p>
             <a:fld id="{A16E5697-36CC-4180-92D2-559739295E92}" type="datetimeFigureOut">
               <a:rPr lang="en-US" smtClean="0"/>
-              <a:t>4/27/2016</a:t>
+              <a:t>4/28/2016</a:t>
             </a:fld>
             <a:endParaRPr lang="en-US"/>
           </a:p>
@@ -614,7 +614,7 @@
           <a:p>
             <a:fld id="{A16E5697-36CC-4180-92D2-559739295E92}" type="datetimeFigureOut">
               <a:rPr lang="en-US" smtClean="0"/>
-              <a:t>4/27/2016</a:t>
+              <a:t>4/28/2016</a:t>
             </a:fld>
             <a:endParaRPr lang="en-US"/>
           </a:p>
@@ -784,7 +784,7 @@
           <a:p>
             <a:fld id="{A16E5697-36CC-4180-92D2-559739295E92}" type="datetimeFigureOut">
               <a:rPr lang="en-US" smtClean="0"/>
-              <a:t>4/27/2016</a:t>
+              <a:t>4/28/2016</a:t>
             </a:fld>
             <a:endParaRPr lang="en-US"/>
           </a:p>
@@ -1028,7 +1028,7 @@
           <a:p>
             <a:fld id="{A16E5697-36CC-4180-92D2-559739295E92}" type="datetimeFigureOut">
               <a:rPr lang="en-US" smtClean="0"/>
-              <a:t>4/27/2016</a:t>
+              <a:t>4/28/2016</a:t>
             </a:fld>
             <a:endParaRPr lang="en-US"/>
           </a:p>
@@ -1260,7 +1260,7 @@
           <a:p>
             <a:fld id="{A16E5697-36CC-4180-92D2-559739295E92}" type="datetimeFigureOut">
               <a:rPr lang="en-US" smtClean="0"/>
-              <a:t>4/27/2016</a:t>
+              <a:t>4/28/2016</a:t>
             </a:fld>
             <a:endParaRPr lang="en-US"/>
           </a:p>
@@ -1627,7 +1627,7 @@
           <a:p>
             <a:fld id="{A16E5697-36CC-4180-92D2-559739295E92}" type="datetimeFigureOut">
               <a:rPr lang="en-US" smtClean="0"/>
-              <a:t>4/27/2016</a:t>
+              <a:t>4/28/2016</a:t>
             </a:fld>
             <a:endParaRPr lang="en-US"/>
           </a:p>
@@ -1745,7 +1745,7 @@
           <a:p>
             <a:fld id="{A16E5697-36CC-4180-92D2-559739295E92}" type="datetimeFigureOut">
               <a:rPr lang="en-US" smtClean="0"/>
-              <a:t>4/27/2016</a:t>
+              <a:t>4/28/2016</a:t>
             </a:fld>
             <a:endParaRPr lang="en-US"/>
           </a:p>
@@ -1840,7 +1840,7 @@
           <a:p>
             <a:fld id="{A16E5697-36CC-4180-92D2-559739295E92}" type="datetimeFigureOut">
               <a:rPr lang="en-US" smtClean="0"/>
-              <a:t>4/27/2016</a:t>
+              <a:t>4/28/2016</a:t>
             </a:fld>
             <a:endParaRPr lang="en-US"/>
           </a:p>
@@ -2117,7 +2117,7 @@
           <a:p>
             <a:fld id="{A16E5697-36CC-4180-92D2-559739295E92}" type="datetimeFigureOut">
               <a:rPr lang="en-US" smtClean="0"/>
-              <a:t>4/27/2016</a:t>
+              <a:t>4/28/2016</a:t>
             </a:fld>
             <a:endParaRPr lang="en-US"/>
           </a:p>
@@ -2374,7 +2374,7 @@
           <a:p>
             <a:fld id="{A16E5697-36CC-4180-92D2-559739295E92}" type="datetimeFigureOut">
               <a:rPr lang="en-US" smtClean="0"/>
-              <a:t>4/27/2016</a:t>
+              <a:t>4/28/2016</a:t>
             </a:fld>
             <a:endParaRPr lang="en-US"/>
           </a:p>
@@ -2587,7 +2587,7 @@
           <a:p>
             <a:fld id="{A16E5697-36CC-4180-92D2-559739295E92}" type="datetimeFigureOut">
               <a:rPr lang="en-US" smtClean="0"/>
-              <a:t>4/27/2016</a:t>
+              <a:t>4/28/2016</a:t>
             </a:fld>
             <a:endParaRPr lang="en-US"/>
           </a:p>
@@ -3183,8 +3183,8 @@
           </a:xfrm>
         </p:spPr>
       </p:pic>
-      <mc:AlternateContent xmlns:mc="http://schemas.openxmlformats.org/markup-compatibility/2006" xmlns:a14="http://schemas.microsoft.com/office/drawing/2010/main">
-        <mc:Choice Requires="a14">
+      <mc:AlternateContent xmlns:mc="http://schemas.openxmlformats.org/markup-compatibility/2006">
+        <mc:Choice xmlns:a14="http://schemas.microsoft.com/office/drawing/2010/main" Requires="a14">
           <p:sp>
             <p:nvSpPr>
               <p:cNvPr id="3" name="Content Placeholder 2"/>
@@ -3209,6 +3209,109 @@
                       <m:jc m:val="centerGroup"/>
                     </m:oMathParaPr>
                     <m:oMath xmlns:m="http://schemas.openxmlformats.org/officeDocument/2006/math">
+                      <m:r>
+                        <a:rPr lang="en-US" sz="1800" i="1" smtClean="0">
+                          <a:solidFill>
+                            <a:srgbClr val="00B050"/>
+                          </a:solidFill>
+                          <a:latin typeface="Cambria Math" panose="02040503050406030204" pitchFamily="18" charset="0"/>
+                        </a:rPr>
+                        <m:t>𝑢𝑏</m:t>
+                      </m:r>
+                      <m:d>
+                        <m:dPr>
+                          <m:ctrlPr>
+                            <a:rPr lang="en-US" sz="1800" i="1">
+                              <a:solidFill>
+                                <a:srgbClr val="00B050"/>
+                              </a:solidFill>
+                              <a:latin typeface="Cambria Math" panose="02040503050406030204" pitchFamily="18" charset="0"/>
+                            </a:rPr>
+                          </m:ctrlPr>
+                        </m:dPr>
+                        <m:e>
+                          <m:r>
+                            <a:rPr lang="en-US" sz="1800" i="1">
+                              <a:solidFill>
+                                <a:srgbClr val="00B050"/>
+                              </a:solidFill>
+                              <a:latin typeface="Cambria Math" panose="02040503050406030204" pitchFamily="18" charset="0"/>
+                            </a:rPr>
+                            <m:t>𝑥</m:t>
+                          </m:r>
+                        </m:e>
+                      </m:d>
+                      <m:r>
+                        <a:rPr lang="en-US" sz="1800" i="1">
+                          <a:latin typeface="Cambria Math" panose="02040503050406030204" pitchFamily="18" charset="0"/>
+                        </a:rPr>
+                        <m:t>+</m:t>
+                      </m:r>
+                      <m:r>
+                        <a:rPr lang="en-US" sz="1800" i="1">
+                          <a:solidFill>
+                            <a:srgbClr val="FFC000"/>
+                          </a:solidFill>
+                          <a:latin typeface="Cambria Math" panose="02040503050406030204" pitchFamily="18" charset="0"/>
+                        </a:rPr>
+                        <m:t>𝛿</m:t>
+                      </m:r>
+                      <m:d>
+                        <m:dPr>
+                          <m:ctrlPr>
+                            <a:rPr lang="en-US" sz="1800" i="1">
+                              <a:solidFill>
+                                <a:srgbClr val="FFC000"/>
+                              </a:solidFill>
+                              <a:latin typeface="Cambria Math" panose="02040503050406030204" pitchFamily="18" charset="0"/>
+                            </a:rPr>
+                          </m:ctrlPr>
+                        </m:dPr>
+                        <m:e>
+                          <m:r>
+                            <a:rPr lang="en-US" sz="1800" i="1">
+                              <a:solidFill>
+                                <a:srgbClr val="FFC000"/>
+                              </a:solidFill>
+                              <a:latin typeface="Cambria Math" panose="02040503050406030204" pitchFamily="18" charset="0"/>
+                            </a:rPr>
+                            <m:t>𝑏</m:t>
+                          </m:r>
+                          <m:d>
+                            <m:dPr>
+                              <m:ctrlPr>
+                                <a:rPr lang="en-US" sz="1800" i="1">
+                                  <a:solidFill>
+                                    <a:srgbClr val="FFC000"/>
+                                  </a:solidFill>
+                                  <a:latin typeface="Cambria Math" panose="02040503050406030204" pitchFamily="18" charset="0"/>
+                                </a:rPr>
+                              </m:ctrlPr>
+                            </m:dPr>
+                            <m:e>
+                              <m:r>
+                                <a:rPr lang="en-US" sz="1800" i="1">
+                                  <a:solidFill>
+                                    <a:srgbClr val="FFC000"/>
+                                  </a:solidFill>
+                                  <a:latin typeface="Cambria Math" panose="02040503050406030204" pitchFamily="18" charset="0"/>
+                                </a:rPr>
+                                <m:t>𝑥</m:t>
+                              </m:r>
+                            </m:e>
+                          </m:d>
+                        </m:e>
+                      </m:d>
+                      <m:r>
+                        <a:rPr lang="en-US" sz="1800" b="0" i="1" smtClean="0">
+                          <a:solidFill>
+                            <a:srgbClr val="CC00CC"/>
+                          </a:solidFill>
+                          <a:latin typeface="Cambria Math" panose="02040503050406030204" pitchFamily="18" charset="0"/>
+                          <a:ea typeface="Cambria Math" panose="02040503050406030204" pitchFamily="18" charset="0"/>
+                        </a:rPr>
+                        <m:t>≤</m:t>
+                      </m:r>
                       <m:r>
                         <a:rPr lang="en-US" sz="1800" i="1" smtClean="0">
                           <a:solidFill>
@@ -3369,109 +3472,6 @@
                           </m:d>
                         </m:e>
                       </m:func>
-                      <m:r>
-                        <a:rPr lang="en-US" sz="1800" b="1" smtClean="0">
-                          <a:solidFill>
-                            <a:srgbClr val="CC00CC"/>
-                          </a:solidFill>
-                          <a:latin typeface="Cambria Math" panose="02040503050406030204" pitchFamily="18" charset="0"/>
-                          <a:ea typeface="Cambria Math" panose="02040503050406030204" pitchFamily="18" charset="0"/>
-                        </a:rPr>
-                        <m:t>≥</m:t>
-                      </m:r>
-                      <m:r>
-                        <a:rPr lang="en-US" sz="1800" i="1">
-                          <a:solidFill>
-                            <a:srgbClr val="00B050"/>
-                          </a:solidFill>
-                          <a:latin typeface="Cambria Math" panose="02040503050406030204" pitchFamily="18" charset="0"/>
-                        </a:rPr>
-                        <m:t>𝑢𝑏</m:t>
-                      </m:r>
-                      <m:d>
-                        <m:dPr>
-                          <m:ctrlPr>
-                            <a:rPr lang="en-US" sz="1800" i="1">
-                              <a:solidFill>
-                                <a:srgbClr val="00B050"/>
-                              </a:solidFill>
-                              <a:latin typeface="Cambria Math" panose="02040503050406030204" pitchFamily="18" charset="0"/>
-                            </a:rPr>
-                          </m:ctrlPr>
-                        </m:dPr>
-                        <m:e>
-                          <m:r>
-                            <a:rPr lang="en-US" sz="1800" i="1">
-                              <a:solidFill>
-                                <a:srgbClr val="00B050"/>
-                              </a:solidFill>
-                              <a:latin typeface="Cambria Math" panose="02040503050406030204" pitchFamily="18" charset="0"/>
-                            </a:rPr>
-                            <m:t>𝑥</m:t>
-                          </m:r>
-                        </m:e>
-                      </m:d>
-                      <m:r>
-                        <a:rPr lang="en-US" sz="1800" i="1">
-                          <a:latin typeface="Cambria Math" panose="02040503050406030204" pitchFamily="18" charset="0"/>
-                        </a:rPr>
-                        <m:t>+</m:t>
-                      </m:r>
-                      <m:r>
-                        <a:rPr lang="en-US" sz="1800" i="1">
-                          <a:solidFill>
-                            <a:srgbClr val="FFC000"/>
-                          </a:solidFill>
-                          <a:latin typeface="Cambria Math" panose="02040503050406030204" pitchFamily="18" charset="0"/>
-                        </a:rPr>
-                        <m:t>𝛿</m:t>
-                      </m:r>
-                      <m:d>
-                        <m:dPr>
-                          <m:ctrlPr>
-                            <a:rPr lang="en-US" sz="1800" i="1">
-                              <a:solidFill>
-                                <a:srgbClr val="FFC000"/>
-                              </a:solidFill>
-                              <a:latin typeface="Cambria Math" panose="02040503050406030204" pitchFamily="18" charset="0"/>
-                            </a:rPr>
-                          </m:ctrlPr>
-                        </m:dPr>
-                        <m:e>
-                          <m:r>
-                            <a:rPr lang="en-US" sz="1800" i="1">
-                              <a:solidFill>
-                                <a:srgbClr val="FFC000"/>
-                              </a:solidFill>
-                              <a:latin typeface="Cambria Math" panose="02040503050406030204" pitchFamily="18" charset="0"/>
-                            </a:rPr>
-                            <m:t>𝑏</m:t>
-                          </m:r>
-                          <m:d>
-                            <m:dPr>
-                              <m:ctrlPr>
-                                <a:rPr lang="en-US" sz="1800" i="1">
-                                  <a:solidFill>
-                                    <a:srgbClr val="FFC000"/>
-                                  </a:solidFill>
-                                  <a:latin typeface="Cambria Math" panose="02040503050406030204" pitchFamily="18" charset="0"/>
-                                </a:rPr>
-                              </m:ctrlPr>
-                            </m:dPr>
-                            <m:e>
-                              <m:r>
-                                <a:rPr lang="en-US" sz="1800" i="1">
-                                  <a:solidFill>
-                                    <a:srgbClr val="FFC000"/>
-                                  </a:solidFill>
-                                  <a:latin typeface="Cambria Math" panose="02040503050406030204" pitchFamily="18" charset="0"/>
-                                </a:rPr>
-                                <m:t>𝑥</m:t>
-                              </m:r>
-                            </m:e>
-                          </m:d>
-                        </m:e>
-                      </m:d>
                     </m:oMath>
                   </m:oMathPara>
                 </a14:m>
@@ -3480,7 +3480,7 @@
             </p:txBody>
           </p:sp>
         </mc:Choice>
-        <mc:Fallback xmlns="">
+        <mc:Fallback>
           <p:sp>
             <p:nvSpPr>
               <p:cNvPr id="3" name="Content Placeholder 2"/>
@@ -9595,6 +9595,13 @@
   <p:clrMapOvr>
     <a:masterClrMapping/>
   </p:clrMapOvr>
+  <p:timing>
+    <p:tnLst>
+      <p:par>
+        <p:cTn id="1" dur="indefinite" restart="never" nodeType="tmRoot"/>
+      </p:par>
+    </p:tnLst>
+  </p:timing>
 </p:sld>
 </file>
 
@@ -9682,6 +9689,13 @@
   <p:clrMapOvr>
     <a:masterClrMapping/>
   </p:clrMapOvr>
+  <p:timing>
+    <p:tnLst>
+      <p:par>
+        <p:cTn id="1" dur="indefinite" restart="never" nodeType="tmRoot"/>
+      </p:par>
+    </p:tnLst>
+  </p:timing>
 </p:sld>
 </file>
 
@@ -9769,6 +9783,13 @@
   <p:clrMapOvr>
     <a:masterClrMapping/>
   </p:clrMapOvr>
+  <p:timing>
+    <p:tnLst>
+      <p:par>
+        <p:cTn id="1" dur="indefinite" restart="never" nodeType="tmRoot"/>
+      </p:par>
+    </p:tnLst>
+  </p:timing>
 </p:sld>
 </file>
 
@@ -9985,8 +10006,8 @@
           </a:p>
         </p:txBody>
       </p:sp>
-      <mc:AlternateContent xmlns:mc="http://schemas.openxmlformats.org/markup-compatibility/2006" xmlns:a14="http://schemas.microsoft.com/office/drawing/2010/main">
-        <mc:Choice Requires="a14">
+      <mc:AlternateContent xmlns:mc="http://schemas.openxmlformats.org/markup-compatibility/2006">
+        <mc:Choice xmlns:a14="http://schemas.microsoft.com/office/drawing/2010/main" Requires="a14">
           <p:sp>
             <p:nvSpPr>
               <p:cNvPr id="6" name="Content Placeholder 5"/>
@@ -10087,6 +10108,81 @@
                       <m:jc m:val="centerGroup"/>
                     </m:oMathParaPr>
                     <m:oMath xmlns:m="http://schemas.openxmlformats.org/officeDocument/2006/math">
+                      <m:r>
+                        <a:rPr lang="en-US" i="1">
+                          <a:latin typeface="Cambria Math" panose="02040503050406030204" pitchFamily="18" charset="0"/>
+                        </a:rPr>
+                        <m:t>𝑢𝑏</m:t>
+                      </m:r>
+                      <m:d>
+                        <m:dPr>
+                          <m:ctrlPr>
+                            <a:rPr lang="en-US" i="1">
+                              <a:latin typeface="Cambria Math" panose="02040503050406030204" pitchFamily="18" charset="0"/>
+                            </a:rPr>
+                          </m:ctrlPr>
+                        </m:dPr>
+                        <m:e>
+                          <m:r>
+                            <a:rPr lang="en-US" i="1">
+                              <a:latin typeface="Cambria Math" panose="02040503050406030204" pitchFamily="18" charset="0"/>
+                            </a:rPr>
+                            <m:t>𝑥</m:t>
+                          </m:r>
+                        </m:e>
+                      </m:d>
+                      <m:r>
+                        <a:rPr lang="en-US" i="1">
+                          <a:latin typeface="Cambria Math" panose="02040503050406030204" pitchFamily="18" charset="0"/>
+                        </a:rPr>
+                        <m:t>+</m:t>
+                      </m:r>
+                      <m:r>
+                        <a:rPr lang="en-US" i="1">
+                          <a:latin typeface="Cambria Math" panose="02040503050406030204" pitchFamily="18" charset="0"/>
+                        </a:rPr>
+                        <m:t>𝛿</m:t>
+                      </m:r>
+                      <m:d>
+                        <m:dPr>
+                          <m:ctrlPr>
+                            <a:rPr lang="en-US" i="1">
+                              <a:latin typeface="Cambria Math" panose="02040503050406030204" pitchFamily="18" charset="0"/>
+                            </a:rPr>
+                          </m:ctrlPr>
+                        </m:dPr>
+                        <m:e>
+                          <m:r>
+                            <a:rPr lang="en-US" i="1">
+                              <a:latin typeface="Cambria Math" panose="02040503050406030204" pitchFamily="18" charset="0"/>
+                            </a:rPr>
+                            <m:t>𝑏</m:t>
+                          </m:r>
+                          <m:d>
+                            <m:dPr>
+                              <m:ctrlPr>
+                                <a:rPr lang="en-US" i="1">
+                                  <a:latin typeface="Cambria Math" panose="02040503050406030204" pitchFamily="18" charset="0"/>
+                                </a:rPr>
+                              </m:ctrlPr>
+                            </m:dPr>
+                            <m:e>
+                              <m:r>
+                                <a:rPr lang="en-US" i="1">
+                                  <a:latin typeface="Cambria Math" panose="02040503050406030204" pitchFamily="18" charset="0"/>
+                                </a:rPr>
+                                <m:t>𝑥</m:t>
+                              </m:r>
+                            </m:e>
+                          </m:d>
+                        </m:e>
+                      </m:d>
+                      <m:r>
+                        <a:rPr lang="en-US" b="0" i="1" smtClean="0">
+                          <a:latin typeface="Cambria Math" panose="02040503050406030204" pitchFamily="18" charset="0"/>
+                        </a:rPr>
+                        <m:t>≤</m:t>
+                      </m:r>
                       <m:r>
                         <a:rPr lang="en-US" b="0" i="1" smtClean="0">
                           <a:latin typeface="Cambria Math" panose="02040503050406030204" pitchFamily="18" charset="0"/>
@@ -10193,81 +10289,6 @@
                           </m:d>
                         </m:e>
                       </m:func>
-                      <m:r>
-                        <a:rPr lang="en-US" b="0" i="1" smtClean="0">
-                          <a:latin typeface="Cambria Math" panose="02040503050406030204" pitchFamily="18" charset="0"/>
-                        </a:rPr>
-                        <m:t>≥</m:t>
-                      </m:r>
-                      <m:r>
-                        <a:rPr lang="en-US" b="0" i="1" smtClean="0">
-                          <a:latin typeface="Cambria Math" panose="02040503050406030204" pitchFamily="18" charset="0"/>
-                        </a:rPr>
-                        <m:t>𝑢𝑏</m:t>
-                      </m:r>
-                      <m:d>
-                        <m:dPr>
-                          <m:ctrlPr>
-                            <a:rPr lang="en-US" b="0" i="1" smtClean="0">
-                              <a:latin typeface="Cambria Math" panose="02040503050406030204" pitchFamily="18" charset="0"/>
-                            </a:rPr>
-                          </m:ctrlPr>
-                        </m:dPr>
-                        <m:e>
-                          <m:r>
-                            <a:rPr lang="en-US" b="0" i="1" smtClean="0">
-                              <a:latin typeface="Cambria Math" panose="02040503050406030204" pitchFamily="18" charset="0"/>
-                            </a:rPr>
-                            <m:t>𝑥</m:t>
-                          </m:r>
-                        </m:e>
-                      </m:d>
-                      <m:r>
-                        <a:rPr lang="en-US" b="0" i="1" smtClean="0">
-                          <a:latin typeface="Cambria Math" panose="02040503050406030204" pitchFamily="18" charset="0"/>
-                        </a:rPr>
-                        <m:t>+</m:t>
-                      </m:r>
-                      <m:r>
-                        <a:rPr lang="en-US" b="0" i="1" smtClean="0">
-                          <a:latin typeface="Cambria Math" panose="02040503050406030204" pitchFamily="18" charset="0"/>
-                        </a:rPr>
-                        <m:t>𝛿</m:t>
-                      </m:r>
-                      <m:d>
-                        <m:dPr>
-                          <m:ctrlPr>
-                            <a:rPr lang="en-US" b="0" i="1" smtClean="0">
-                              <a:latin typeface="Cambria Math" panose="02040503050406030204" pitchFamily="18" charset="0"/>
-                            </a:rPr>
-                          </m:ctrlPr>
-                        </m:dPr>
-                        <m:e>
-                          <m:r>
-                            <a:rPr lang="en-US" b="0" i="1" smtClean="0">
-                              <a:latin typeface="Cambria Math" panose="02040503050406030204" pitchFamily="18" charset="0"/>
-                            </a:rPr>
-                            <m:t>𝑏</m:t>
-                          </m:r>
-                          <m:d>
-                            <m:dPr>
-                              <m:ctrlPr>
-                                <a:rPr lang="en-US" b="0" i="1" smtClean="0">
-                                  <a:latin typeface="Cambria Math" panose="02040503050406030204" pitchFamily="18" charset="0"/>
-                                </a:rPr>
-                              </m:ctrlPr>
-                            </m:dPr>
-                            <m:e>
-                              <m:r>
-                                <a:rPr lang="en-US" b="0" i="1" smtClean="0">
-                                  <a:latin typeface="Cambria Math" panose="02040503050406030204" pitchFamily="18" charset="0"/>
-                                </a:rPr>
-                                <m:t>𝑥</m:t>
-                              </m:r>
-                            </m:e>
-                          </m:d>
-                        </m:e>
-                      </m:d>
                     </m:oMath>
                   </m:oMathPara>
                 </a14:m>
@@ -10533,7 +10554,7 @@
             </p:txBody>
           </p:sp>
         </mc:Choice>
-        <mc:Fallback xmlns="">
+        <mc:Fallback>
           <p:sp>
             <p:nvSpPr>
               <p:cNvPr id="6" name="Content Placeholder 5"/>
@@ -10664,8 +10685,8 @@
           </a:xfrm>
         </p:spPr>
       </p:pic>
-      <mc:AlternateContent xmlns:mc="http://schemas.openxmlformats.org/markup-compatibility/2006" xmlns:a14="http://schemas.microsoft.com/office/drawing/2010/main">
-        <mc:Choice Requires="a14">
+      <mc:AlternateContent xmlns:mc="http://schemas.openxmlformats.org/markup-compatibility/2006">
+        <mc:Choice xmlns:a14="http://schemas.microsoft.com/office/drawing/2010/main" Requires="a14">
           <p:sp>
             <p:nvSpPr>
               <p:cNvPr id="3" name="Content Placeholder 2"/>
@@ -10690,6 +10711,125 @@
                       <m:jc m:val="centerGroup"/>
                     </m:oMathParaPr>
                     <m:oMath xmlns:m="http://schemas.openxmlformats.org/officeDocument/2006/math">
+                      <m:r>
+                        <a:rPr lang="en-US" sz="1800" i="1">
+                          <a:solidFill>
+                            <a:srgbClr val="00B050"/>
+                          </a:solidFill>
+                          <a:latin typeface="Cambria Math" panose="02040503050406030204" pitchFamily="18" charset="0"/>
+                        </a:rPr>
+                        <m:t>𝑢𝑏</m:t>
+                      </m:r>
+                      <m:d>
+                        <m:dPr>
+                          <m:ctrlPr>
+                            <a:rPr lang="en-US" sz="1800" i="1">
+                              <a:solidFill>
+                                <a:srgbClr val="00B050"/>
+                              </a:solidFill>
+                              <a:latin typeface="Cambria Math" panose="02040503050406030204" pitchFamily="18" charset="0"/>
+                            </a:rPr>
+                          </m:ctrlPr>
+                        </m:dPr>
+                        <m:e>
+                          <m:r>
+                            <a:rPr lang="en-US" sz="1800" i="1">
+                              <a:solidFill>
+                                <a:srgbClr val="00B050"/>
+                              </a:solidFill>
+                              <a:latin typeface="Cambria Math" panose="02040503050406030204" pitchFamily="18" charset="0"/>
+                            </a:rPr>
+                            <m:t>𝑥</m:t>
+                          </m:r>
+                        </m:e>
+                      </m:d>
+                      <m:r>
+                        <a:rPr lang="en-US" sz="1800" i="1">
+                          <a:solidFill>
+                            <a:schemeClr val="bg1">
+                              <a:lumMod val="65000"/>
+                            </a:schemeClr>
+                          </a:solidFill>
+                          <a:latin typeface="Cambria Math" panose="02040503050406030204" pitchFamily="18" charset="0"/>
+                        </a:rPr>
+                        <m:t>+</m:t>
+                      </m:r>
+                      <m:r>
+                        <a:rPr lang="en-US" sz="1800" i="1">
+                          <a:solidFill>
+                            <a:schemeClr val="bg1">
+                              <a:lumMod val="65000"/>
+                            </a:schemeClr>
+                          </a:solidFill>
+                          <a:latin typeface="Cambria Math" panose="02040503050406030204" pitchFamily="18" charset="0"/>
+                        </a:rPr>
+                        <m:t>𝛿</m:t>
+                      </m:r>
+                      <m:d>
+                        <m:dPr>
+                          <m:ctrlPr>
+                            <a:rPr lang="en-US" sz="1800" i="1">
+                              <a:solidFill>
+                                <a:schemeClr val="bg1">
+                                  <a:lumMod val="65000"/>
+                                </a:schemeClr>
+                              </a:solidFill>
+                              <a:latin typeface="Cambria Math" panose="02040503050406030204" pitchFamily="18" charset="0"/>
+                            </a:rPr>
+                          </m:ctrlPr>
+                        </m:dPr>
+                        <m:e>
+                          <m:r>
+                            <a:rPr lang="en-US" sz="1800" i="1">
+                              <a:solidFill>
+                                <a:schemeClr val="bg1">
+                                  <a:lumMod val="65000"/>
+                                </a:schemeClr>
+                              </a:solidFill>
+                              <a:latin typeface="Cambria Math" panose="02040503050406030204" pitchFamily="18" charset="0"/>
+                            </a:rPr>
+                            <m:t>𝑏</m:t>
+                          </m:r>
+                          <m:d>
+                            <m:dPr>
+                              <m:ctrlPr>
+                                <a:rPr lang="en-US" sz="1800" i="1">
+                                  <a:solidFill>
+                                    <a:schemeClr val="bg1">
+                                      <a:lumMod val="65000"/>
+                                    </a:schemeClr>
+                                  </a:solidFill>
+                                  <a:latin typeface="Cambria Math" panose="02040503050406030204" pitchFamily="18" charset="0"/>
+                                </a:rPr>
+                              </m:ctrlPr>
+                            </m:dPr>
+                            <m:e>
+                              <m:r>
+                                <a:rPr lang="en-US" sz="1800" i="1">
+                                  <a:solidFill>
+                                    <a:schemeClr val="bg1">
+                                      <a:lumMod val="65000"/>
+                                    </a:schemeClr>
+                                  </a:solidFill>
+                                  <a:latin typeface="Cambria Math" panose="02040503050406030204" pitchFamily="18" charset="0"/>
+                                </a:rPr>
+                                <m:t>𝑥</m:t>
+                              </m:r>
+                            </m:e>
+                          </m:d>
+                        </m:e>
+                      </m:d>
+                      <m:r>
+                        <a:rPr lang="en-US" sz="1800" b="0" i="1" smtClean="0">
+                          <a:solidFill>
+                            <a:schemeClr val="bg1">
+                              <a:lumMod val="65000"/>
+                            </a:schemeClr>
+                          </a:solidFill>
+                          <a:latin typeface="Cambria Math" panose="02040503050406030204" pitchFamily="18" charset="0"/>
+                        </a:rPr>
+                        <m:t>≤</m:t>
+                      </m:r>
                       <m:r>
                         <a:rPr lang="en-US" sz="1800" i="1" smtClean="0">
                           <a:solidFill>
@@ -10855,120 +10995,6 @@
                           </m:d>
                         </m:e>
                       </m:func>
-                      <m:r>
-                        <a:rPr lang="en-US" sz="1800" i="1">
-                          <a:latin typeface="Cambria Math" panose="02040503050406030204" pitchFamily="18" charset="0"/>
-                        </a:rPr>
-                        <m:t>≥</m:t>
-                      </m:r>
-                      <m:r>
-                        <a:rPr lang="en-US" sz="1800" i="1" smtClean="0">
-                          <a:solidFill>
-                            <a:srgbClr val="00B050"/>
-                          </a:solidFill>
-                          <a:latin typeface="Cambria Math" panose="02040503050406030204" pitchFamily="18" charset="0"/>
-                        </a:rPr>
-                        <m:t>𝑢𝑏</m:t>
-                      </m:r>
-                      <m:d>
-                        <m:dPr>
-                          <m:ctrlPr>
-                            <a:rPr lang="en-US" sz="1800" i="1">
-                              <a:solidFill>
-                                <a:srgbClr val="00B050"/>
-                              </a:solidFill>
-                              <a:latin typeface="Cambria Math" panose="02040503050406030204" pitchFamily="18" charset="0"/>
-                            </a:rPr>
-                          </m:ctrlPr>
-                        </m:dPr>
-                        <m:e>
-                          <m:r>
-                            <a:rPr lang="en-US" sz="1800" i="1">
-                              <a:solidFill>
-                                <a:srgbClr val="00B050"/>
-                              </a:solidFill>
-                              <a:latin typeface="Cambria Math" panose="02040503050406030204" pitchFamily="18" charset="0"/>
-                            </a:rPr>
-                            <m:t>𝑥</m:t>
-                          </m:r>
-                        </m:e>
-                      </m:d>
-                      <m:r>
-                        <a:rPr lang="en-US" sz="1800" i="1" smtClean="0">
-                          <a:solidFill>
-                            <a:schemeClr val="bg1">
-                              <a:lumMod val="65000"/>
-                            </a:schemeClr>
-                          </a:solidFill>
-                          <a:latin typeface="Cambria Math" panose="02040503050406030204" pitchFamily="18" charset="0"/>
-                        </a:rPr>
-                        <m:t>+</m:t>
-                      </m:r>
-                      <m:r>
-                        <a:rPr lang="en-US" sz="1800" i="1" smtClean="0">
-                          <a:solidFill>
-                            <a:schemeClr val="bg1">
-                              <a:lumMod val="65000"/>
-                            </a:schemeClr>
-                          </a:solidFill>
-                          <a:latin typeface="Cambria Math" panose="02040503050406030204" pitchFamily="18" charset="0"/>
-                        </a:rPr>
-                        <m:t>𝛿</m:t>
-                      </m:r>
-                      <m:d>
-                        <m:dPr>
-                          <m:ctrlPr>
-                            <a:rPr lang="en-US" sz="1800" i="1">
-                              <a:solidFill>
-                                <a:schemeClr val="bg1">
-                                  <a:lumMod val="65000"/>
-                                </a:schemeClr>
-                              </a:solidFill>
-                              <a:latin typeface="Cambria Math" panose="02040503050406030204" pitchFamily="18" charset="0"/>
-                            </a:rPr>
-                          </m:ctrlPr>
-                        </m:dPr>
-                        <m:e>
-                          <m:r>
-                            <a:rPr lang="en-US" sz="1800" i="1">
-                              <a:solidFill>
-                                <a:schemeClr val="bg1">
-                                  <a:lumMod val="65000"/>
-                                </a:schemeClr>
-                              </a:solidFill>
-                              <a:latin typeface="Cambria Math" panose="02040503050406030204" pitchFamily="18" charset="0"/>
-                            </a:rPr>
-                            <m:t>𝑏</m:t>
-                          </m:r>
-                          <m:d>
-                            <m:dPr>
-                              <m:ctrlPr>
-                                <a:rPr lang="en-US" sz="1800" i="1">
-                                  <a:solidFill>
-                                    <a:schemeClr val="bg1">
-                                      <a:lumMod val="65000"/>
-                                    </a:schemeClr>
-                                  </a:solidFill>
-                                  <a:latin typeface="Cambria Math" panose="02040503050406030204" pitchFamily="18" charset="0"/>
-                                </a:rPr>
-                              </m:ctrlPr>
-                            </m:dPr>
-                            <m:e>
-                              <m:r>
-                                <a:rPr lang="en-US" sz="1800" i="1">
-                                  <a:solidFill>
-                                    <a:schemeClr val="bg1">
-                                      <a:lumMod val="65000"/>
-                                    </a:schemeClr>
-                                  </a:solidFill>
-                                  <a:latin typeface="Cambria Math" panose="02040503050406030204" pitchFamily="18" charset="0"/>
-                                </a:rPr>
-                                <m:t>𝑥</m:t>
-                              </m:r>
-                            </m:e>
-                          </m:d>
-                        </m:e>
-                      </m:d>
                     </m:oMath>
                   </m:oMathPara>
                 </a14:m>
@@ -10977,7 +11003,7 @@
             </p:txBody>
           </p:sp>
         </mc:Choice>
-        <mc:Fallback xmlns="">
+        <mc:Fallback>
           <p:sp>
             <p:nvSpPr>
               <p:cNvPr id="3" name="Content Placeholder 2"/>
@@ -11108,8 +11134,8 @@
           </a:xfrm>
         </p:spPr>
       </p:pic>
-      <mc:AlternateContent xmlns:mc="http://schemas.openxmlformats.org/markup-compatibility/2006" xmlns:a14="http://schemas.microsoft.com/office/drawing/2010/main">
-        <mc:Choice Requires="a14">
+      <mc:AlternateContent xmlns:mc="http://schemas.openxmlformats.org/markup-compatibility/2006">
+        <mc:Choice xmlns:a14="http://schemas.microsoft.com/office/drawing/2010/main" Requires="a14">
           <p:sp>
             <p:nvSpPr>
               <p:cNvPr id="3" name="Content Placeholder 2"/>
@@ -11136,6 +11162,110 @@
                       <m:jc m:val="centerGroup"/>
                     </m:oMathParaPr>
                     <m:oMath xmlns:m="http://schemas.openxmlformats.org/officeDocument/2006/math">
+                      <m:r>
+                        <a:rPr lang="en-US" sz="1800" i="1" smtClean="0">
+                          <a:solidFill>
+                            <a:srgbClr val="00B050"/>
+                          </a:solidFill>
+                          <a:latin typeface="Cambria Math" panose="02040503050406030204" pitchFamily="18" charset="0"/>
+                        </a:rPr>
+                        <m:t>𝑢𝑏</m:t>
+                      </m:r>
+                      <m:d>
+                        <m:dPr>
+                          <m:ctrlPr>
+                            <a:rPr lang="en-US" sz="1800" i="1">
+                              <a:solidFill>
+                                <a:srgbClr val="00B050"/>
+                              </a:solidFill>
+                              <a:latin typeface="Cambria Math" panose="02040503050406030204" pitchFamily="18" charset="0"/>
+                            </a:rPr>
+                          </m:ctrlPr>
+                        </m:dPr>
+                        <m:e>
+                          <m:r>
+                            <a:rPr lang="en-US" sz="1800" i="1">
+                              <a:solidFill>
+                                <a:srgbClr val="00B050"/>
+                              </a:solidFill>
+                              <a:latin typeface="Cambria Math" panose="02040503050406030204" pitchFamily="18" charset="0"/>
+                            </a:rPr>
+                            <m:t>𝑥</m:t>
+                          </m:r>
+                        </m:e>
+                      </m:d>
+                      <m:r>
+                        <a:rPr lang="en-US" sz="1800" i="1">
+                          <a:latin typeface="Cambria Math" panose="02040503050406030204" pitchFamily="18" charset="0"/>
+                        </a:rPr>
+                        <m:t>+</m:t>
+                      </m:r>
+                      <m:r>
+                        <a:rPr lang="en-US" sz="1800" i="1">
+                          <a:solidFill>
+                            <a:srgbClr val="FFC000"/>
+                          </a:solidFill>
+                          <a:latin typeface="Cambria Math" panose="02040503050406030204" pitchFamily="18" charset="0"/>
+                        </a:rPr>
+                        <m:t>𝛿</m:t>
+                      </m:r>
+                      <m:d>
+                        <m:dPr>
+                          <m:ctrlPr>
+                            <a:rPr lang="en-US" sz="1800" i="1">
+                              <a:solidFill>
+                                <a:srgbClr val="FFC000"/>
+                              </a:solidFill>
+                              <a:latin typeface="Cambria Math" panose="02040503050406030204" pitchFamily="18" charset="0"/>
+                            </a:rPr>
+                          </m:ctrlPr>
+                        </m:dPr>
+                        <m:e>
+                          <m:r>
+                            <a:rPr lang="en-US" sz="1800" i="1">
+                              <a:solidFill>
+                                <a:srgbClr val="FFC000"/>
+                              </a:solidFill>
+                              <a:latin typeface="Cambria Math" panose="02040503050406030204" pitchFamily="18" charset="0"/>
+                            </a:rPr>
+                            <m:t>𝑏</m:t>
+                          </m:r>
+                          <m:d>
+                            <m:dPr>
+                              <m:ctrlPr>
+                                <a:rPr lang="en-US" sz="1800" i="1">
+                                  <a:solidFill>
+                                    <a:srgbClr val="FFC000"/>
+                                  </a:solidFill>
+                                  <a:latin typeface="Cambria Math" panose="02040503050406030204" pitchFamily="18" charset="0"/>
+                                </a:rPr>
+                              </m:ctrlPr>
+                            </m:dPr>
+                            <m:e>
+                              <m:r>
+                                <a:rPr lang="en-US" sz="1800" i="1">
+                                  <a:solidFill>
+                                    <a:srgbClr val="FFC000"/>
+                                  </a:solidFill>
+                                  <a:latin typeface="Cambria Math" panose="02040503050406030204" pitchFamily="18" charset="0"/>
+                                </a:rPr>
+                                <m:t>𝑥</m:t>
+                              </m:r>
+                            </m:e>
+                          </m:d>
+                        </m:e>
+                      </m:d>
+                      <m:r>
+                        <a:rPr lang="en-US" sz="1800" b="0" i="1" smtClean="0">
+                          <a:solidFill>
+                            <a:schemeClr val="bg1">
+                              <a:lumMod val="65000"/>
+                            </a:schemeClr>
+                          </a:solidFill>
+                          <a:latin typeface="Cambria Math" panose="02040503050406030204" pitchFamily="18" charset="0"/>
+                        </a:rPr>
+                        <m:t>≤</m:t>
+                      </m:r>
                       <m:r>
                         <a:rPr lang="en-US" sz="1800" i="1">
                           <a:solidFill>
@@ -11299,113 +11429,6 @@
                           </m:d>
                         </m:e>
                       </m:func>
-                      <m:r>
-                        <a:rPr lang="en-US" sz="1800" i="1" smtClean="0">
-                          <a:solidFill>
-                            <a:schemeClr val="bg1">
-                              <a:lumMod val="65000"/>
-                            </a:schemeClr>
-                          </a:solidFill>
-                          <a:latin typeface="Cambria Math" panose="02040503050406030204" pitchFamily="18" charset="0"/>
-                        </a:rPr>
-                        <m:t>≥</m:t>
-                      </m:r>
-                      <m:r>
-                        <a:rPr lang="en-US" sz="1800" i="1">
-                          <a:solidFill>
-                            <a:srgbClr val="00B050"/>
-                          </a:solidFill>
-                          <a:latin typeface="Cambria Math" panose="02040503050406030204" pitchFamily="18" charset="0"/>
-                        </a:rPr>
-                        <m:t>𝑢𝑏</m:t>
-                      </m:r>
-                      <m:d>
-                        <m:dPr>
-                          <m:ctrlPr>
-                            <a:rPr lang="en-US" sz="1800" i="1">
-                              <a:solidFill>
-                                <a:srgbClr val="00B050"/>
-                              </a:solidFill>
-                              <a:latin typeface="Cambria Math" panose="02040503050406030204" pitchFamily="18" charset="0"/>
-                            </a:rPr>
-                          </m:ctrlPr>
-                        </m:dPr>
-                        <m:e>
-                          <m:r>
-                            <a:rPr lang="en-US" sz="1800" i="1">
-                              <a:solidFill>
-                                <a:srgbClr val="00B050"/>
-                              </a:solidFill>
-                              <a:latin typeface="Cambria Math" panose="02040503050406030204" pitchFamily="18" charset="0"/>
-                            </a:rPr>
-                            <m:t>𝑥</m:t>
-                          </m:r>
-                        </m:e>
-                      </m:d>
-                      <m:r>
-                        <a:rPr lang="en-US" sz="1800" i="1" smtClean="0">
-                          <a:solidFill>
-                            <a:schemeClr val="tx1"/>
-                          </a:solidFill>
-                          <a:latin typeface="Cambria Math" panose="02040503050406030204" pitchFamily="18" charset="0"/>
-                        </a:rPr>
-                        <m:t>+</m:t>
-                      </m:r>
-                      <m:r>
-                        <a:rPr lang="en-US" sz="1800" i="1" smtClean="0">
-                          <a:solidFill>
-                            <a:srgbClr val="FFC000"/>
-                          </a:solidFill>
-                          <a:latin typeface="Cambria Math" panose="02040503050406030204" pitchFamily="18" charset="0"/>
-                        </a:rPr>
-                        <m:t>𝛿</m:t>
-                      </m:r>
-                      <m:d>
-                        <m:dPr>
-                          <m:ctrlPr>
-                            <a:rPr lang="en-US" sz="1800" i="1">
-                              <a:solidFill>
-                                <a:srgbClr val="FFC000"/>
-                              </a:solidFill>
-                              <a:latin typeface="Cambria Math" panose="02040503050406030204" pitchFamily="18" charset="0"/>
-                            </a:rPr>
-                          </m:ctrlPr>
-                        </m:dPr>
-                        <m:e>
-                          <m:r>
-                            <a:rPr lang="en-US" sz="1800" i="1">
-                              <a:solidFill>
-                                <a:srgbClr val="FFC000"/>
-                              </a:solidFill>
-                              <a:latin typeface="Cambria Math" panose="02040503050406030204" pitchFamily="18" charset="0"/>
-                            </a:rPr>
-                            <m:t>𝑏</m:t>
-                          </m:r>
-                          <m:d>
-                            <m:dPr>
-                              <m:ctrlPr>
-                                <a:rPr lang="en-US" sz="1800" i="1">
-                                  <a:solidFill>
-                                    <a:srgbClr val="FFC000"/>
-                                  </a:solidFill>
-                                  <a:latin typeface="Cambria Math" panose="02040503050406030204" pitchFamily="18" charset="0"/>
-                                </a:rPr>
-                              </m:ctrlPr>
-                            </m:dPr>
-                            <m:e>
-                              <m:r>
-                                <a:rPr lang="en-US" sz="1800" i="1">
-                                  <a:solidFill>
-                                    <a:srgbClr val="FFC000"/>
-                                  </a:solidFill>
-                                  <a:latin typeface="Cambria Math" panose="02040503050406030204" pitchFamily="18" charset="0"/>
-                                </a:rPr>
-                                <m:t>𝑥</m:t>
-                              </m:r>
-                            </m:e>
-                          </m:d>
-                        </m:e>
-                      </m:d>
                     </m:oMath>
                   </m:oMathPara>
                 </a14:m>
@@ -11414,7 +11437,7 @@
             </p:txBody>
           </p:sp>
         </mc:Choice>
-        <mc:Fallback xmlns="">
+        <mc:Fallback>
           <p:sp>
             <p:nvSpPr>
               <p:cNvPr id="3" name="Content Placeholder 2"/>
@@ -12308,8 +12331,8 @@
           </a:xfrm>
         </p:spPr>
       </p:pic>
-      <mc:AlternateContent xmlns:mc="http://schemas.openxmlformats.org/markup-compatibility/2006" xmlns:a14="http://schemas.microsoft.com/office/drawing/2010/main">
-        <mc:Choice Requires="a14">
+      <mc:AlternateContent xmlns:mc="http://schemas.openxmlformats.org/markup-compatibility/2006">
+        <mc:Choice xmlns:a14="http://schemas.microsoft.com/office/drawing/2010/main" Requires="a14">
           <p:sp>
             <p:nvSpPr>
               <p:cNvPr id="3" name="Content Placeholder 2"/>
@@ -12336,6 +12359,109 @@
                       <m:jc m:val="centerGroup"/>
                     </m:oMathParaPr>
                     <m:oMath xmlns:m="http://schemas.openxmlformats.org/officeDocument/2006/math">
+                      <m:r>
+                        <a:rPr lang="en-US" sz="1800" i="1">
+                          <a:solidFill>
+                            <a:srgbClr val="00B050"/>
+                          </a:solidFill>
+                          <a:latin typeface="Cambria Math" panose="02040503050406030204" pitchFamily="18" charset="0"/>
+                        </a:rPr>
+                        <m:t>𝑢𝑏</m:t>
+                      </m:r>
+                      <m:d>
+                        <m:dPr>
+                          <m:ctrlPr>
+                            <a:rPr lang="en-US" sz="1800" i="1">
+                              <a:solidFill>
+                                <a:srgbClr val="00B050"/>
+                              </a:solidFill>
+                              <a:latin typeface="Cambria Math" panose="02040503050406030204" pitchFamily="18" charset="0"/>
+                            </a:rPr>
+                          </m:ctrlPr>
+                        </m:dPr>
+                        <m:e>
+                          <m:r>
+                            <a:rPr lang="en-US" sz="1800" i="1">
+                              <a:solidFill>
+                                <a:srgbClr val="00B050"/>
+                              </a:solidFill>
+                              <a:latin typeface="Cambria Math" panose="02040503050406030204" pitchFamily="18" charset="0"/>
+                            </a:rPr>
+                            <m:t>𝑥</m:t>
+                          </m:r>
+                        </m:e>
+                      </m:d>
+                      <m:r>
+                        <a:rPr lang="en-US" sz="1800" i="1">
+                          <a:latin typeface="Cambria Math" panose="02040503050406030204" pitchFamily="18" charset="0"/>
+                        </a:rPr>
+                        <m:t>+</m:t>
+                      </m:r>
+                      <m:r>
+                        <a:rPr lang="en-US" sz="1800" i="1">
+                          <a:solidFill>
+                            <a:srgbClr val="FFC000"/>
+                          </a:solidFill>
+                          <a:latin typeface="Cambria Math" panose="02040503050406030204" pitchFamily="18" charset="0"/>
+                        </a:rPr>
+                        <m:t>𝛿</m:t>
+                      </m:r>
+                      <m:d>
+                        <m:dPr>
+                          <m:ctrlPr>
+                            <a:rPr lang="en-US" sz="1800" i="1">
+                              <a:solidFill>
+                                <a:srgbClr val="FFC000"/>
+                              </a:solidFill>
+                              <a:latin typeface="Cambria Math" panose="02040503050406030204" pitchFamily="18" charset="0"/>
+                            </a:rPr>
+                          </m:ctrlPr>
+                        </m:dPr>
+                        <m:e>
+                          <m:r>
+                            <a:rPr lang="en-US" sz="1800" i="1">
+                              <a:solidFill>
+                                <a:srgbClr val="FFC000"/>
+                              </a:solidFill>
+                              <a:latin typeface="Cambria Math" panose="02040503050406030204" pitchFamily="18" charset="0"/>
+                            </a:rPr>
+                            <m:t>𝑏</m:t>
+                          </m:r>
+                          <m:d>
+                            <m:dPr>
+                              <m:ctrlPr>
+                                <a:rPr lang="en-US" sz="1800" i="1">
+                                  <a:solidFill>
+                                    <a:srgbClr val="FFC000"/>
+                                  </a:solidFill>
+                                  <a:latin typeface="Cambria Math" panose="02040503050406030204" pitchFamily="18" charset="0"/>
+                                </a:rPr>
+                              </m:ctrlPr>
+                            </m:dPr>
+                            <m:e>
+                              <m:r>
+                                <a:rPr lang="en-US" sz="1800" i="1">
+                                  <a:solidFill>
+                                    <a:srgbClr val="FFC000"/>
+                                  </a:solidFill>
+                                  <a:latin typeface="Cambria Math" panose="02040503050406030204" pitchFamily="18" charset="0"/>
+                                </a:rPr>
+                                <m:t>𝑥</m:t>
+                              </m:r>
+                            </m:e>
+                          </m:d>
+                        </m:e>
+                      </m:d>
+                      <m:r>
+                        <a:rPr lang="en-US" sz="1800" b="1" i="1" smtClean="0">
+                          <a:solidFill>
+                            <a:srgbClr val="CC00CC"/>
+                          </a:solidFill>
+                          <a:latin typeface="Cambria Math" panose="02040503050406030204" pitchFamily="18" charset="0"/>
+                          <a:ea typeface="Cambria Math" panose="02040503050406030204" pitchFamily="18" charset="0"/>
+                        </a:rPr>
+                        <m:t>≰</m:t>
+                      </m:r>
                       <m:r>
                         <a:rPr lang="en-US" sz="1800" i="1">
                           <a:solidFill>
@@ -12496,109 +12622,6 @@
                           </m:d>
                         </m:e>
                       </m:func>
-                      <m:r>
-                        <a:rPr lang="en-US" sz="1800" b="1" i="0" smtClean="0">
-                          <a:solidFill>
-                            <a:srgbClr val="CC00CC"/>
-                          </a:solidFill>
-                          <a:latin typeface="Cambria Math" panose="02040503050406030204" pitchFamily="18" charset="0"/>
-                          <a:ea typeface="Cambria Math" panose="02040503050406030204" pitchFamily="18" charset="0"/>
-                        </a:rPr>
-                        <m:t>≱</m:t>
-                      </m:r>
-                      <m:r>
-                        <a:rPr lang="en-US" sz="1800" i="1">
-                          <a:solidFill>
-                            <a:srgbClr val="00B050"/>
-                          </a:solidFill>
-                          <a:latin typeface="Cambria Math" panose="02040503050406030204" pitchFamily="18" charset="0"/>
-                        </a:rPr>
-                        <m:t>𝑢𝑏</m:t>
-                      </m:r>
-                      <m:d>
-                        <m:dPr>
-                          <m:ctrlPr>
-                            <a:rPr lang="en-US" sz="1800" i="1">
-                              <a:solidFill>
-                                <a:srgbClr val="00B050"/>
-                              </a:solidFill>
-                              <a:latin typeface="Cambria Math" panose="02040503050406030204" pitchFamily="18" charset="0"/>
-                            </a:rPr>
-                          </m:ctrlPr>
-                        </m:dPr>
-                        <m:e>
-                          <m:r>
-                            <a:rPr lang="en-US" sz="1800" i="1">
-                              <a:solidFill>
-                                <a:srgbClr val="00B050"/>
-                              </a:solidFill>
-                              <a:latin typeface="Cambria Math" panose="02040503050406030204" pitchFamily="18" charset="0"/>
-                            </a:rPr>
-                            <m:t>𝑥</m:t>
-                          </m:r>
-                        </m:e>
-                      </m:d>
-                      <m:r>
-                        <a:rPr lang="en-US" sz="1800" i="1">
-                          <a:latin typeface="Cambria Math" panose="02040503050406030204" pitchFamily="18" charset="0"/>
-                        </a:rPr>
-                        <m:t>+</m:t>
-                      </m:r>
-                      <m:r>
-                        <a:rPr lang="en-US" sz="1800" i="1">
-                          <a:solidFill>
-                            <a:srgbClr val="FFC000"/>
-                          </a:solidFill>
-                          <a:latin typeface="Cambria Math" panose="02040503050406030204" pitchFamily="18" charset="0"/>
-                        </a:rPr>
-                        <m:t>𝛿</m:t>
-                      </m:r>
-                      <m:d>
-                        <m:dPr>
-                          <m:ctrlPr>
-                            <a:rPr lang="en-US" sz="1800" i="1">
-                              <a:solidFill>
-                                <a:srgbClr val="FFC000"/>
-                              </a:solidFill>
-                              <a:latin typeface="Cambria Math" panose="02040503050406030204" pitchFamily="18" charset="0"/>
-                            </a:rPr>
-                          </m:ctrlPr>
-                        </m:dPr>
-                        <m:e>
-                          <m:r>
-                            <a:rPr lang="en-US" sz="1800" i="1">
-                              <a:solidFill>
-                                <a:srgbClr val="FFC000"/>
-                              </a:solidFill>
-                              <a:latin typeface="Cambria Math" panose="02040503050406030204" pitchFamily="18" charset="0"/>
-                            </a:rPr>
-                            <m:t>𝑏</m:t>
-                          </m:r>
-                          <m:d>
-                            <m:dPr>
-                              <m:ctrlPr>
-                                <a:rPr lang="en-US" sz="1800" i="1">
-                                  <a:solidFill>
-                                    <a:srgbClr val="FFC000"/>
-                                  </a:solidFill>
-                                  <a:latin typeface="Cambria Math" panose="02040503050406030204" pitchFamily="18" charset="0"/>
-                                </a:rPr>
-                              </m:ctrlPr>
-                            </m:dPr>
-                            <m:e>
-                              <m:r>
-                                <a:rPr lang="en-US" sz="1800" i="1">
-                                  <a:solidFill>
-                                    <a:srgbClr val="FFC000"/>
-                                  </a:solidFill>
-                                  <a:latin typeface="Cambria Math" panose="02040503050406030204" pitchFamily="18" charset="0"/>
-                                </a:rPr>
-                                <m:t>𝑥</m:t>
-                              </m:r>
-                            </m:e>
-                          </m:d>
-                        </m:e>
-                      </m:d>
                     </m:oMath>
                   </m:oMathPara>
                 </a14:m>
@@ -12607,7 +12630,7 @@
             </p:txBody>
           </p:sp>
         </mc:Choice>
-        <mc:Fallback xmlns="">
+        <mc:Fallback>
           <p:sp>
             <p:nvSpPr>
               <p:cNvPr id="3" name="Content Placeholder 2"/>
@@ -12859,8 +12882,8 @@
           </a:xfrm>
         </p:spPr>
       </p:pic>
-      <mc:AlternateContent xmlns:mc="http://schemas.openxmlformats.org/markup-compatibility/2006" xmlns:a14="http://schemas.microsoft.com/office/drawing/2010/main">
-        <mc:Choice Requires="a14">
+      <mc:AlternateContent xmlns:mc="http://schemas.openxmlformats.org/markup-compatibility/2006">
+        <mc:Choice xmlns:a14="http://schemas.microsoft.com/office/drawing/2010/main" Requires="a14">
           <p:sp>
             <p:nvSpPr>
               <p:cNvPr id="3" name="Content Placeholder 2"/>
@@ -12885,6 +12908,120 @@
                       <m:jc m:val="centerGroup"/>
                     </m:oMathParaPr>
                     <m:oMath xmlns:m="http://schemas.openxmlformats.org/officeDocument/2006/math">
+                      <m:r>
+                        <a:rPr lang="en-US" sz="1800" i="1">
+                          <a:solidFill>
+                            <a:srgbClr val="00B050"/>
+                          </a:solidFill>
+                          <a:latin typeface="Cambria Math" panose="02040503050406030204" pitchFamily="18" charset="0"/>
+                        </a:rPr>
+                        <m:t>𝑢𝑏</m:t>
+                      </m:r>
+                      <m:d>
+                        <m:dPr>
+                          <m:ctrlPr>
+                            <a:rPr lang="en-US" sz="1800" i="1">
+                              <a:solidFill>
+                                <a:srgbClr val="00B050"/>
+                              </a:solidFill>
+                              <a:latin typeface="Cambria Math" panose="02040503050406030204" pitchFamily="18" charset="0"/>
+                            </a:rPr>
+                          </m:ctrlPr>
+                        </m:dPr>
+                        <m:e>
+                          <m:r>
+                            <a:rPr lang="en-US" sz="1800" i="1">
+                              <a:solidFill>
+                                <a:srgbClr val="00B050"/>
+                              </a:solidFill>
+                              <a:latin typeface="Cambria Math" panose="02040503050406030204" pitchFamily="18" charset="0"/>
+                            </a:rPr>
+                            <m:t>𝑥</m:t>
+                          </m:r>
+                        </m:e>
+                      </m:d>
+                      <m:r>
+                        <a:rPr lang="en-US" sz="1800" i="1">
+                          <a:solidFill>
+                            <a:schemeClr val="bg1">
+                              <a:lumMod val="65000"/>
+                            </a:schemeClr>
+                          </a:solidFill>
+                          <a:latin typeface="Cambria Math" panose="02040503050406030204" pitchFamily="18" charset="0"/>
+                        </a:rPr>
+                        <m:t>+</m:t>
+                      </m:r>
+                      <m:r>
+                        <a:rPr lang="en-US" sz="1800" i="1">
+                          <a:solidFill>
+                            <a:schemeClr val="bg1">
+                              <a:lumMod val="65000"/>
+                            </a:schemeClr>
+                          </a:solidFill>
+                          <a:latin typeface="Cambria Math" panose="02040503050406030204" pitchFamily="18" charset="0"/>
+                        </a:rPr>
+                        <m:t>𝛿</m:t>
+                      </m:r>
+                      <m:d>
+                        <m:dPr>
+                          <m:ctrlPr>
+                            <a:rPr lang="en-US" sz="1800" i="1">
+                              <a:solidFill>
+                                <a:schemeClr val="bg1">
+                                  <a:lumMod val="65000"/>
+                                </a:schemeClr>
+                              </a:solidFill>
+                              <a:latin typeface="Cambria Math" panose="02040503050406030204" pitchFamily="18" charset="0"/>
+                            </a:rPr>
+                          </m:ctrlPr>
+                        </m:dPr>
+                        <m:e>
+                          <m:r>
+                            <a:rPr lang="en-US" sz="1800" i="1">
+                              <a:solidFill>
+                                <a:schemeClr val="bg1">
+                                  <a:lumMod val="65000"/>
+                                </a:schemeClr>
+                              </a:solidFill>
+                              <a:latin typeface="Cambria Math" panose="02040503050406030204" pitchFamily="18" charset="0"/>
+                            </a:rPr>
+                            <m:t>𝑏</m:t>
+                          </m:r>
+                          <m:d>
+                            <m:dPr>
+                              <m:ctrlPr>
+                                <a:rPr lang="en-US" sz="1800" i="1">
+                                  <a:solidFill>
+                                    <a:schemeClr val="bg1">
+                                      <a:lumMod val="65000"/>
+                                    </a:schemeClr>
+                                  </a:solidFill>
+                                  <a:latin typeface="Cambria Math" panose="02040503050406030204" pitchFamily="18" charset="0"/>
+                                </a:rPr>
+                              </m:ctrlPr>
+                            </m:dPr>
+                            <m:e>
+                              <m:r>
+                                <a:rPr lang="en-US" sz="1800" i="1">
+                                  <a:solidFill>
+                                    <a:schemeClr val="bg1">
+                                      <a:lumMod val="65000"/>
+                                    </a:schemeClr>
+                                  </a:solidFill>
+                                  <a:latin typeface="Cambria Math" panose="02040503050406030204" pitchFamily="18" charset="0"/>
+                                </a:rPr>
+                                <m:t>𝑥</m:t>
+                              </m:r>
+                            </m:e>
+                          </m:d>
+                        </m:e>
+                      </m:d>
+                      <m:r>
+                        <a:rPr lang="en-US" sz="1800" b="0" i="1" smtClean="0">
+                          <a:latin typeface="Cambria Math" panose="02040503050406030204" pitchFamily="18" charset="0"/>
+                        </a:rPr>
+                        <m:t>≤</m:t>
+                      </m:r>
                       <m:r>
                         <a:rPr lang="en-US" sz="1800" i="1">
                           <a:solidFill>
@@ -13050,120 +13187,6 @@
                           </m:d>
                         </m:e>
                       </m:func>
-                      <m:r>
-                        <a:rPr lang="en-US" sz="1800" i="1">
-                          <a:latin typeface="Cambria Math" panose="02040503050406030204" pitchFamily="18" charset="0"/>
-                        </a:rPr>
-                        <m:t>≥</m:t>
-                      </m:r>
-                      <m:r>
-                        <a:rPr lang="en-US" sz="1800" i="1">
-                          <a:solidFill>
-                            <a:srgbClr val="00B050"/>
-                          </a:solidFill>
-                          <a:latin typeface="Cambria Math" panose="02040503050406030204" pitchFamily="18" charset="0"/>
-                        </a:rPr>
-                        <m:t>𝑢𝑏</m:t>
-                      </m:r>
-                      <m:d>
-                        <m:dPr>
-                          <m:ctrlPr>
-                            <a:rPr lang="en-US" sz="1800" i="1">
-                              <a:solidFill>
-                                <a:srgbClr val="00B050"/>
-                              </a:solidFill>
-                              <a:latin typeface="Cambria Math" panose="02040503050406030204" pitchFamily="18" charset="0"/>
-                            </a:rPr>
-                          </m:ctrlPr>
-                        </m:dPr>
-                        <m:e>
-                          <m:r>
-                            <a:rPr lang="en-US" sz="1800" i="1">
-                              <a:solidFill>
-                                <a:srgbClr val="00B050"/>
-                              </a:solidFill>
-                              <a:latin typeface="Cambria Math" panose="02040503050406030204" pitchFamily="18" charset="0"/>
-                            </a:rPr>
-                            <m:t>𝑥</m:t>
-                          </m:r>
-                        </m:e>
-                      </m:d>
-                      <m:r>
-                        <a:rPr lang="en-US" sz="1800" i="1" smtClean="0">
-                          <a:solidFill>
-                            <a:schemeClr val="bg1">
-                              <a:lumMod val="65000"/>
-                            </a:schemeClr>
-                          </a:solidFill>
-                          <a:latin typeface="Cambria Math" panose="02040503050406030204" pitchFamily="18" charset="0"/>
-                        </a:rPr>
-                        <m:t>+</m:t>
-                      </m:r>
-                      <m:r>
-                        <a:rPr lang="en-US" sz="1800" i="1" smtClean="0">
-                          <a:solidFill>
-                            <a:schemeClr val="bg1">
-                              <a:lumMod val="65000"/>
-                            </a:schemeClr>
-                          </a:solidFill>
-                          <a:latin typeface="Cambria Math" panose="02040503050406030204" pitchFamily="18" charset="0"/>
-                        </a:rPr>
-                        <m:t>𝛿</m:t>
-                      </m:r>
-                      <m:d>
-                        <m:dPr>
-                          <m:ctrlPr>
-                            <a:rPr lang="en-US" sz="1800" i="1">
-                              <a:solidFill>
-                                <a:schemeClr val="bg1">
-                                  <a:lumMod val="65000"/>
-                                </a:schemeClr>
-                              </a:solidFill>
-                              <a:latin typeface="Cambria Math" panose="02040503050406030204" pitchFamily="18" charset="0"/>
-                            </a:rPr>
-                          </m:ctrlPr>
-                        </m:dPr>
-                        <m:e>
-                          <m:r>
-                            <a:rPr lang="en-US" sz="1800" i="1">
-                              <a:solidFill>
-                                <a:schemeClr val="bg1">
-                                  <a:lumMod val="65000"/>
-                                </a:schemeClr>
-                              </a:solidFill>
-                              <a:latin typeface="Cambria Math" panose="02040503050406030204" pitchFamily="18" charset="0"/>
-                            </a:rPr>
-                            <m:t>𝑏</m:t>
-                          </m:r>
-                          <m:d>
-                            <m:dPr>
-                              <m:ctrlPr>
-                                <a:rPr lang="en-US" sz="1800" i="1">
-                                  <a:solidFill>
-                                    <a:schemeClr val="bg1">
-                                      <a:lumMod val="65000"/>
-                                    </a:schemeClr>
-                                  </a:solidFill>
-                                  <a:latin typeface="Cambria Math" panose="02040503050406030204" pitchFamily="18" charset="0"/>
-                                </a:rPr>
-                              </m:ctrlPr>
-                            </m:dPr>
-                            <m:e>
-                              <m:r>
-                                <a:rPr lang="en-US" sz="1800" i="1">
-                                  <a:solidFill>
-                                    <a:schemeClr val="bg1">
-                                      <a:lumMod val="65000"/>
-                                    </a:schemeClr>
-                                  </a:solidFill>
-                                  <a:latin typeface="Cambria Math" panose="02040503050406030204" pitchFamily="18" charset="0"/>
-                                </a:rPr>
-                                <m:t>𝑥</m:t>
-                              </m:r>
-                            </m:e>
-                          </m:d>
-                        </m:e>
-                      </m:d>
                     </m:oMath>
                   </m:oMathPara>
                 </a14:m>
@@ -13172,7 +13195,7 @@
             </p:txBody>
           </p:sp>
         </mc:Choice>
-        <mc:Fallback xmlns="">
+        <mc:Fallback>
           <p:sp>
             <p:nvSpPr>
               <p:cNvPr id="3" name="Content Placeholder 2"/>
@@ -13303,8 +13326,8 @@
           </a:xfrm>
         </p:spPr>
       </p:pic>
-      <mc:AlternateContent xmlns:mc="http://schemas.openxmlformats.org/markup-compatibility/2006" xmlns:a14="http://schemas.microsoft.com/office/drawing/2010/main">
-        <mc:Choice Requires="a14">
+      <mc:AlternateContent xmlns:mc="http://schemas.openxmlformats.org/markup-compatibility/2006">
+        <mc:Choice xmlns:a14="http://schemas.microsoft.com/office/drawing/2010/main" Requires="a14">
           <p:sp>
             <p:nvSpPr>
               <p:cNvPr id="3" name="Content Placeholder 2"/>
@@ -13329,6 +13352,110 @@
                       <m:jc m:val="centerGroup"/>
                     </m:oMathParaPr>
                     <m:oMath xmlns:m="http://schemas.openxmlformats.org/officeDocument/2006/math">
+                      <m:r>
+                        <a:rPr lang="en-US" sz="1800" i="1" smtClean="0">
+                          <a:solidFill>
+                            <a:srgbClr val="00B050"/>
+                          </a:solidFill>
+                          <a:latin typeface="Cambria Math" panose="02040503050406030204" pitchFamily="18" charset="0"/>
+                        </a:rPr>
+                        <m:t>𝑢𝑏</m:t>
+                      </m:r>
+                      <m:d>
+                        <m:dPr>
+                          <m:ctrlPr>
+                            <a:rPr lang="en-US" sz="1800" i="1">
+                              <a:solidFill>
+                                <a:srgbClr val="00B050"/>
+                              </a:solidFill>
+                              <a:latin typeface="Cambria Math" panose="02040503050406030204" pitchFamily="18" charset="0"/>
+                            </a:rPr>
+                          </m:ctrlPr>
+                        </m:dPr>
+                        <m:e>
+                          <m:r>
+                            <a:rPr lang="en-US" sz="1800" i="1">
+                              <a:solidFill>
+                                <a:srgbClr val="00B050"/>
+                              </a:solidFill>
+                              <a:latin typeface="Cambria Math" panose="02040503050406030204" pitchFamily="18" charset="0"/>
+                            </a:rPr>
+                            <m:t>𝑥</m:t>
+                          </m:r>
+                        </m:e>
+                      </m:d>
+                      <m:r>
+                        <a:rPr lang="en-US" sz="1800" i="1">
+                          <a:latin typeface="Cambria Math" panose="02040503050406030204" pitchFamily="18" charset="0"/>
+                        </a:rPr>
+                        <m:t>+</m:t>
+                      </m:r>
+                      <m:r>
+                        <a:rPr lang="en-US" sz="1800" i="1">
+                          <a:solidFill>
+                            <a:srgbClr val="FFC000"/>
+                          </a:solidFill>
+                          <a:latin typeface="Cambria Math" panose="02040503050406030204" pitchFamily="18" charset="0"/>
+                        </a:rPr>
+                        <m:t>𝛿</m:t>
+                      </m:r>
+                      <m:d>
+                        <m:dPr>
+                          <m:ctrlPr>
+                            <a:rPr lang="en-US" sz="1800" i="1">
+                              <a:solidFill>
+                                <a:srgbClr val="FFC000"/>
+                              </a:solidFill>
+                              <a:latin typeface="Cambria Math" panose="02040503050406030204" pitchFamily="18" charset="0"/>
+                            </a:rPr>
+                          </m:ctrlPr>
+                        </m:dPr>
+                        <m:e>
+                          <m:r>
+                            <a:rPr lang="en-US" sz="1800" i="1">
+                              <a:solidFill>
+                                <a:srgbClr val="FFC000"/>
+                              </a:solidFill>
+                              <a:latin typeface="Cambria Math" panose="02040503050406030204" pitchFamily="18" charset="0"/>
+                            </a:rPr>
+                            <m:t>𝑏</m:t>
+                          </m:r>
+                          <m:d>
+                            <m:dPr>
+                              <m:ctrlPr>
+                                <a:rPr lang="en-US" sz="1800" i="1">
+                                  <a:solidFill>
+                                    <a:srgbClr val="FFC000"/>
+                                  </a:solidFill>
+                                  <a:latin typeface="Cambria Math" panose="02040503050406030204" pitchFamily="18" charset="0"/>
+                                </a:rPr>
+                              </m:ctrlPr>
+                            </m:dPr>
+                            <m:e>
+                              <m:r>
+                                <a:rPr lang="en-US" sz="1800" i="1">
+                                  <a:solidFill>
+                                    <a:srgbClr val="FFC000"/>
+                                  </a:solidFill>
+                                  <a:latin typeface="Cambria Math" panose="02040503050406030204" pitchFamily="18" charset="0"/>
+                                </a:rPr>
+                                <m:t>𝑥</m:t>
+                              </m:r>
+                            </m:e>
+                          </m:d>
+                        </m:e>
+                      </m:d>
+                      <m:r>
+                        <a:rPr lang="en-US" sz="1800" b="0" i="1" smtClean="0">
+                          <a:solidFill>
+                            <a:schemeClr val="bg1">
+                              <a:lumMod val="65000"/>
+                            </a:schemeClr>
+                          </a:solidFill>
+                          <a:latin typeface="Cambria Math" panose="02040503050406030204" pitchFamily="18" charset="0"/>
+                        </a:rPr>
+                        <m:t>≤</m:t>
+                      </m:r>
                       <m:r>
                         <a:rPr lang="en-US" sz="1800" i="1">
                           <a:solidFill>
@@ -13489,110 +13616,6 @@
                           </m:d>
                         </m:e>
                       </m:func>
-                      <m:r>
-                        <a:rPr lang="en-US" sz="1800" i="1" smtClean="0">
-                          <a:solidFill>
-                            <a:schemeClr val="bg1">
-                              <a:lumMod val="65000"/>
-                            </a:schemeClr>
-                          </a:solidFill>
-                          <a:latin typeface="Cambria Math" panose="02040503050406030204" pitchFamily="18" charset="0"/>
-                        </a:rPr>
-                        <m:t>≥</m:t>
-                      </m:r>
-                      <m:r>
-                        <a:rPr lang="en-US" sz="1800" i="1">
-                          <a:solidFill>
-                            <a:srgbClr val="00B050"/>
-                          </a:solidFill>
-                          <a:latin typeface="Cambria Math" panose="02040503050406030204" pitchFamily="18" charset="0"/>
-                        </a:rPr>
-                        <m:t>𝑢𝑏</m:t>
-                      </m:r>
-                      <m:d>
-                        <m:dPr>
-                          <m:ctrlPr>
-                            <a:rPr lang="en-US" sz="1800" i="1">
-                              <a:solidFill>
-                                <a:srgbClr val="00B050"/>
-                              </a:solidFill>
-                              <a:latin typeface="Cambria Math" panose="02040503050406030204" pitchFamily="18" charset="0"/>
-                            </a:rPr>
-                          </m:ctrlPr>
-                        </m:dPr>
-                        <m:e>
-                          <m:r>
-                            <a:rPr lang="en-US" sz="1800" i="1">
-                              <a:solidFill>
-                                <a:srgbClr val="00B050"/>
-                              </a:solidFill>
-                              <a:latin typeface="Cambria Math" panose="02040503050406030204" pitchFamily="18" charset="0"/>
-                            </a:rPr>
-                            <m:t>𝑥</m:t>
-                          </m:r>
-                        </m:e>
-                      </m:d>
-                      <m:r>
-                        <a:rPr lang="en-US" sz="1800" i="1">
-                          <a:latin typeface="Cambria Math" panose="02040503050406030204" pitchFamily="18" charset="0"/>
-                        </a:rPr>
-                        <m:t>+</m:t>
-                      </m:r>
-                      <m:r>
-                        <a:rPr lang="en-US" sz="1800" i="1">
-                          <a:solidFill>
-                            <a:srgbClr val="FFC000"/>
-                          </a:solidFill>
-                          <a:latin typeface="Cambria Math" panose="02040503050406030204" pitchFamily="18" charset="0"/>
-                        </a:rPr>
-                        <m:t>𝛿</m:t>
-                      </m:r>
-                      <m:d>
-                        <m:dPr>
-                          <m:ctrlPr>
-                            <a:rPr lang="en-US" sz="1800" i="1">
-                              <a:solidFill>
-                                <a:srgbClr val="FFC000"/>
-                              </a:solidFill>
-                              <a:latin typeface="Cambria Math" panose="02040503050406030204" pitchFamily="18" charset="0"/>
-                            </a:rPr>
-                          </m:ctrlPr>
-                        </m:dPr>
-                        <m:e>
-                          <m:r>
-                            <a:rPr lang="en-US" sz="1800" i="1">
-                              <a:solidFill>
-                                <a:srgbClr val="FFC000"/>
-                              </a:solidFill>
-                              <a:latin typeface="Cambria Math" panose="02040503050406030204" pitchFamily="18" charset="0"/>
-                            </a:rPr>
-                            <m:t>𝑏</m:t>
-                          </m:r>
-                          <m:d>
-                            <m:dPr>
-                              <m:ctrlPr>
-                                <a:rPr lang="en-US" sz="1800" i="1">
-                                  <a:solidFill>
-                                    <a:srgbClr val="FFC000"/>
-                                  </a:solidFill>
-                                  <a:latin typeface="Cambria Math" panose="02040503050406030204" pitchFamily="18" charset="0"/>
-                                </a:rPr>
-                              </m:ctrlPr>
-                            </m:dPr>
-                            <m:e>
-                              <m:r>
-                                <a:rPr lang="en-US" sz="1800" i="1">
-                                  <a:solidFill>
-                                    <a:srgbClr val="FFC000"/>
-                                  </a:solidFill>
-                                  <a:latin typeface="Cambria Math" panose="02040503050406030204" pitchFamily="18" charset="0"/>
-                                </a:rPr>
-                                <m:t>𝑥</m:t>
-                              </m:r>
-                            </m:e>
-                          </m:d>
-                        </m:e>
-                      </m:d>
                     </m:oMath>
                   </m:oMathPara>
                 </a14:m>
@@ -13601,7 +13624,7 @@
             </p:txBody>
           </p:sp>
         </mc:Choice>
-        <mc:Fallback xmlns="">
+        <mc:Fallback>
           <p:sp>
             <p:nvSpPr>
               <p:cNvPr id="3" name="Content Placeholder 2"/>

</xml_diff>